<commit_message>
added document styling razor component
</commit_message>
<xml_diff>
--- a/Employee_Manager_Client/ExcelBlanks/blankppt1.pptx
+++ b/Employee_Manager_Client/ExcelBlanks/blankppt1.pptx
@@ -261,7 +261,7 @@
           <a:p>
             <a:fld id="{A0C56383-4D39-4EB3-819C-EA5D3B052261}" type="datetimeFigureOut">
               <a:rPr lang="en-IN" smtClean="0"/>
-              <a:t>18-04-2024</a:t>
+              <a:t>19-04-2024</a:t>
             </a:fld>
             <a:endParaRPr lang="en-IN"/>
           </a:p>
@@ -461,7 +461,7 @@
           <a:p>
             <a:fld id="{A0C56383-4D39-4EB3-819C-EA5D3B052261}" type="datetimeFigureOut">
               <a:rPr lang="en-IN" smtClean="0"/>
-              <a:t>18-04-2024</a:t>
+              <a:t>19-04-2024</a:t>
             </a:fld>
             <a:endParaRPr lang="en-IN"/>
           </a:p>
@@ -671,7 +671,7 @@
           <a:p>
             <a:fld id="{A0C56383-4D39-4EB3-819C-EA5D3B052261}" type="datetimeFigureOut">
               <a:rPr lang="en-IN" smtClean="0"/>
-              <a:t>18-04-2024</a:t>
+              <a:t>19-04-2024</a:t>
             </a:fld>
             <a:endParaRPr lang="en-IN"/>
           </a:p>
@@ -871,7 +871,7 @@
           <a:p>
             <a:fld id="{A0C56383-4D39-4EB3-819C-EA5D3B052261}" type="datetimeFigureOut">
               <a:rPr lang="en-IN" smtClean="0"/>
-              <a:t>18-04-2024</a:t>
+              <a:t>19-04-2024</a:t>
             </a:fld>
             <a:endParaRPr lang="en-IN"/>
           </a:p>
@@ -1147,7 +1147,7 @@
           <a:p>
             <a:fld id="{A0C56383-4D39-4EB3-819C-EA5D3B052261}" type="datetimeFigureOut">
               <a:rPr lang="en-IN" smtClean="0"/>
-              <a:t>18-04-2024</a:t>
+              <a:t>19-04-2024</a:t>
             </a:fld>
             <a:endParaRPr lang="en-IN"/>
           </a:p>
@@ -1415,7 +1415,7 @@
           <a:p>
             <a:fld id="{A0C56383-4D39-4EB3-819C-EA5D3B052261}" type="datetimeFigureOut">
               <a:rPr lang="en-IN" smtClean="0"/>
-              <a:t>18-04-2024</a:t>
+              <a:t>19-04-2024</a:t>
             </a:fld>
             <a:endParaRPr lang="en-IN"/>
           </a:p>
@@ -1830,7 +1830,7 @@
           <a:p>
             <a:fld id="{A0C56383-4D39-4EB3-819C-EA5D3B052261}" type="datetimeFigureOut">
               <a:rPr lang="en-IN" smtClean="0"/>
-              <a:t>18-04-2024</a:t>
+              <a:t>19-04-2024</a:t>
             </a:fld>
             <a:endParaRPr lang="en-IN"/>
           </a:p>
@@ -1972,7 +1972,7 @@
           <a:p>
             <a:fld id="{A0C56383-4D39-4EB3-819C-EA5D3B052261}" type="datetimeFigureOut">
               <a:rPr lang="en-IN" smtClean="0"/>
-              <a:t>18-04-2024</a:t>
+              <a:t>19-04-2024</a:t>
             </a:fld>
             <a:endParaRPr lang="en-IN"/>
           </a:p>
@@ -2085,7 +2085,7 @@
           <a:p>
             <a:fld id="{A0C56383-4D39-4EB3-819C-EA5D3B052261}" type="datetimeFigureOut">
               <a:rPr lang="en-IN" smtClean="0"/>
-              <a:t>18-04-2024</a:t>
+              <a:t>19-04-2024</a:t>
             </a:fld>
             <a:endParaRPr lang="en-IN"/>
           </a:p>
@@ -2398,7 +2398,7 @@
           <a:p>
             <a:fld id="{A0C56383-4D39-4EB3-819C-EA5D3B052261}" type="datetimeFigureOut">
               <a:rPr lang="en-IN" smtClean="0"/>
-              <a:t>18-04-2024</a:t>
+              <a:t>19-04-2024</a:t>
             </a:fld>
             <a:endParaRPr lang="en-IN"/>
           </a:p>
@@ -2687,7 +2687,7 @@
           <a:p>
             <a:fld id="{A0C56383-4D39-4EB3-819C-EA5D3B052261}" type="datetimeFigureOut">
               <a:rPr lang="en-IN" smtClean="0"/>
-              <a:t>18-04-2024</a:t>
+              <a:t>19-04-2024</a:t>
             </a:fld>
             <a:endParaRPr lang="en-IN"/>
           </a:p>
@@ -2930,7 +2930,7 @@
           <a:p>
             <a:fld id="{A0C56383-4D39-4EB3-819C-EA5D3B052261}" type="datetimeFigureOut">
               <a:rPr lang="en-IN" smtClean="0"/>
-              <a:t>18-04-2024</a:t>
+              <a:t>19-04-2024</a:t>
             </a:fld>
             <a:endParaRPr lang="en-IN"/>
           </a:p>
@@ -3331,7 +3331,7 @@
 </file>
 
 <file path=ppt/slides/slide1.xml><?xml version="1.0" encoding="utf-8"?>
-<p:sld xmlns:a16="http://schemas.microsoft.com/office/drawing/2014/main" xmlns:a14="http://schemas.microsoft.com/office/drawing/2010/main" xmlns:p14="http://schemas.microsoft.com/office/powerpoint/2010/main" xmlns:a="http://schemas.openxmlformats.org/drawingml/2006/main" xmlns:r="http://schemas.openxmlformats.org/officeDocument/2006/relationships" xmlns:p="http://schemas.openxmlformats.org/presentationml/2006/main">
+<p:sld xmlns:a="http://schemas.openxmlformats.org/drawingml/2006/main" xmlns:r="http://schemas.openxmlformats.org/officeDocument/2006/relationships" xmlns:p="http://schemas.openxmlformats.org/presentationml/2006/main">
   <p:cSld>
     <p:spTree>
       <p:nvGrpSpPr>
@@ -3402,33 +3402,6 @@
           </a:p>
         </p:txBody>
       </p:sp>
-      <p:pic>
-        <p:nvPicPr>
-          <p:cNvPr id="3" name="My Shape"/>
-          <p:cNvPicPr>
-            <a:picLocks noChangeAspect="1"/>
-          </p:cNvPicPr>
-          <p:nvPr/>
-        </p:nvPicPr>
-        <p:blipFill>
-          <a:blip r:embed="R6bec5880a4524597">
-            <a:extLst>
-              <a:ext uri="{28A0092B-C50C-407E-A947-70E740481C1C}">
-                <a14:useLocalDpi xmlns:a14="http://schemas.microsoft.com/office/drawing/2010/main" val="0"/>
-              </a:ext>
-            </a:extLst>
-          </a:blip>
-          <a:stretch>
-            <a:fillRect/>
-          </a:stretch>
-        </p:blipFill>
-        <p:spPr>
-          <a:xfrm>
-            <a:ext cx="1300000" cy="1800000"/>
-          </a:xfrm>
-          <a:prstGeom prst="rect"/>
-        </p:spPr>
-      </p:pic>
     </p:spTree>
     <p:extLst>
       <p:ext uri="{BB962C8B-B14F-4D97-AF65-F5344CB8AC3E}">

</xml_diff>